<commit_message>
added interrupt vector table for atmega328
</commit_message>
<xml_diff>
--- a/Presentations/AVR Live Class 4.pptx
+++ b/Presentations/AVR Live Class 4.pptx
@@ -283,14 +283,6 @@
 </p:presentation>
 </file>
 
-<file path=ppt/revisionInfo.xml><?xml version="1.0" encoding="utf-8"?>
-<p1510:revInfo xmlns:a="http://schemas.openxmlformats.org/drawingml/2006/main" xmlns:r="http://schemas.openxmlformats.org/officeDocument/2006/relationships" xmlns:p1510="http://schemas.microsoft.com/office/powerpoint/2015/10/main">
-  <p1510:revLst>
-    <p1510:client id="{74A0FDCB-8D3E-4423-9BF7-1BCBE49BE68A}" v="9" dt="2025-09-12T13:41:36.408"/>
-  </p1510:revLst>
-</p1510:revInfo>
-</file>
-
 <file path=ppt/changesInfos/changesInfo1.xml><?xml version="1.0" encoding="utf-8"?>
 <pc:chgInfo xmlns:a="http://schemas.openxmlformats.org/drawingml/2006/main" xmlns:r="http://schemas.openxmlformats.org/officeDocument/2006/relationships" xmlns:ac="http://schemas.microsoft.com/office/drawing/2013/main/command" xmlns:pc="http://schemas.microsoft.com/office/powerpoint/2013/main/command">
   <pc:docChgLst>
@@ -415,22 +407,6 @@
           <pc:docMk/>
           <pc:sldMk cId="1488398723" sldId="286"/>
         </pc:sldMkLst>
-        <pc:spChg chg="mod">
-          <ac:chgData name="Sreejith Rajan" userId="ec11bca0e4bee75f" providerId="LiveId" clId="{7CA8E155-B939-49A2-B258-5F667E7F83F2}" dt="2025-09-01T13:29:03.591" v="390" actId="20577"/>
-          <ac:spMkLst>
-            <pc:docMk/>
-            <pc:sldMk cId="1488398723" sldId="286"/>
-            <ac:spMk id="54" creationId="{D6A271FB-F06E-A094-1264-BE3F39E98C88}"/>
-          </ac:spMkLst>
-        </pc:spChg>
-        <pc:spChg chg="mod">
-          <ac:chgData name="Sreejith Rajan" userId="ec11bca0e4bee75f" providerId="LiveId" clId="{7CA8E155-B939-49A2-B258-5F667E7F83F2}" dt="2025-09-01T14:25:23.987" v="736" actId="207"/>
-          <ac:spMkLst>
-            <pc:docMk/>
-            <pc:sldMk cId="1488398723" sldId="286"/>
-            <ac:spMk id="55" creationId="{E31F05FC-C44B-CD53-A530-278FD5640965}"/>
-          </ac:spMkLst>
-        </pc:spChg>
       </pc:sldChg>
       <pc:sldChg chg="new del">
         <pc:chgData name="Sreejith Rajan" userId="ec11bca0e4bee75f" providerId="LiveId" clId="{7CA8E155-B939-49A2-B258-5F667E7F83F2}" dt="2025-09-01T13:28:42.025" v="369" actId="680"/>
@@ -444,7 +420,7 @@
   <pc:docChgLst>
     <pc:chgData name="Sreejith Rajan" userId="ec11bca0e4bee75f" providerId="LiveId" clId="{7B4F392D-EAB3-4CE7-903E-F84869825F47}"/>
     <pc:docChg chg="undo custSel addSld delSld modSld sldOrd">
-      <pc:chgData name="Sreejith Rajan" userId="ec11bca0e4bee75f" providerId="LiveId" clId="{7B4F392D-EAB3-4CE7-903E-F84869825F47}" dt="2025-09-12T13:42:10.819" v="847" actId="47"/>
+      <pc:chgData name="Sreejith Rajan" userId="ec11bca0e4bee75f" providerId="LiveId" clId="{7B4F392D-EAB3-4CE7-903E-F84869825F47}" dt="2025-09-30T02:20:00.308" v="853"/>
       <pc:docMkLst>
         <pc:docMk/>
       </pc:docMkLst>
@@ -495,11 +471,27 @@
         </pc:picChg>
       </pc:sldChg>
       <pc:sldChg chg="delSp modSp mod ord">
-        <pc:chgData name="Sreejith Rajan" userId="ec11bca0e4bee75f" providerId="LiveId" clId="{7B4F392D-EAB3-4CE7-903E-F84869825F47}" dt="2025-09-12T13:28:16.447" v="748"/>
+        <pc:chgData name="Sreejith Rajan" userId="ec11bca0e4bee75f" providerId="LiveId" clId="{7B4F392D-EAB3-4CE7-903E-F84869825F47}" dt="2025-09-30T02:20:00.308" v="853"/>
         <pc:sldMkLst>
           <pc:docMk/>
           <pc:sldMk cId="2768999598" sldId="285"/>
         </pc:sldMkLst>
+        <pc:spChg chg="del mod">
+          <ac:chgData name="Sreejith Rajan" userId="ec11bca0e4bee75f" providerId="LiveId" clId="{7B4F392D-EAB3-4CE7-903E-F84869825F47}" dt="2025-09-30T02:20:00.307" v="851"/>
+          <ac:spMkLst>
+            <pc:docMk/>
+            <pc:sldMk cId="2768999598" sldId="285"/>
+            <ac:spMk id="6" creationId="{20F1C902-EA40-2049-5E0F-6877922BA01D}"/>
+          </ac:spMkLst>
+        </pc:spChg>
+        <pc:spChg chg="del mod">
+          <ac:chgData name="Sreejith Rajan" userId="ec11bca0e4bee75f" providerId="LiveId" clId="{7B4F392D-EAB3-4CE7-903E-F84869825F47}" dt="2025-09-30T02:20:00.308" v="853"/>
+          <ac:spMkLst>
+            <pc:docMk/>
+            <pc:sldMk cId="2768999598" sldId="285"/>
+            <ac:spMk id="7" creationId="{61EA9A41-0228-6B61-02CB-7BDC9E84AF59}"/>
+          </ac:spMkLst>
+        </pc:spChg>
         <pc:spChg chg="mod">
           <ac:chgData name="Sreejith Rajan" userId="ec11bca0e4bee75f" providerId="LiveId" clId="{7B4F392D-EAB3-4CE7-903E-F84869825F47}" dt="2025-09-12T13:28:16.447" v="748"/>
           <ac:spMkLst>
@@ -523,30 +515,6 @@
           <pc:docMk/>
           <pc:sldMk cId="1488398723" sldId="286"/>
         </pc:sldMkLst>
-        <pc:spChg chg="mod">
-          <ac:chgData name="Sreejith Rajan" userId="ec11bca0e4bee75f" providerId="LiveId" clId="{7B4F392D-EAB3-4CE7-903E-F84869825F47}" dt="2025-09-10T14:14:19.870" v="370" actId="20577"/>
-          <ac:spMkLst>
-            <pc:docMk/>
-            <pc:sldMk cId="1488398723" sldId="286"/>
-            <ac:spMk id="54" creationId="{D6A271FB-F06E-A094-1264-BE3F39E98C88}"/>
-          </ac:spMkLst>
-        </pc:spChg>
-        <pc:spChg chg="mod">
-          <ac:chgData name="Sreejith Rajan" userId="ec11bca0e4bee75f" providerId="LiveId" clId="{7B4F392D-EAB3-4CE7-903E-F84869825F47}" dt="2025-09-10T14:16:56.929" v="374" actId="5793"/>
-          <ac:spMkLst>
-            <pc:docMk/>
-            <pc:sldMk cId="1488398723" sldId="286"/>
-            <ac:spMk id="55" creationId="{E31F05FC-C44B-CD53-A530-278FD5640965}"/>
-          </ac:spMkLst>
-        </pc:spChg>
-        <pc:picChg chg="add mod">
-          <ac:chgData name="Sreejith Rajan" userId="ec11bca0e4bee75f" providerId="LiveId" clId="{7B4F392D-EAB3-4CE7-903E-F84869825F47}" dt="2025-09-10T14:17:53.785" v="379" actId="1076"/>
-          <ac:picMkLst>
-            <pc:docMk/>
-            <pc:sldMk cId="1488398723" sldId="286"/>
-            <ac:picMk id="5" creationId="{E2F35488-A20E-1E50-32DE-4BAD09977703}"/>
-          </ac:picMkLst>
-        </pc:picChg>
       </pc:sldChg>
       <pc:sldChg chg="modSp add del mod ord">
         <pc:chgData name="Sreejith Rajan" userId="ec11bca0e4bee75f" providerId="LiveId" clId="{7B4F392D-EAB3-4CE7-903E-F84869825F47}" dt="2025-09-12T13:42:10.819" v="847" actId="47"/>
@@ -554,22 +522,6 @@
           <pc:docMk/>
           <pc:sldMk cId="922807137" sldId="287"/>
         </pc:sldMkLst>
-        <pc:spChg chg="mod">
-          <ac:chgData name="Sreejith Rajan" userId="ec11bca0e4bee75f" providerId="LiveId" clId="{7B4F392D-EAB3-4CE7-903E-F84869825F47}" dt="2025-09-10T14:22:42.325" v="424" actId="20577"/>
-          <ac:spMkLst>
-            <pc:docMk/>
-            <pc:sldMk cId="922807137" sldId="287"/>
-            <ac:spMk id="54" creationId="{7939AAA9-39A8-3E5A-EE5B-4753522B5E62}"/>
-          </ac:spMkLst>
-        </pc:spChg>
-        <pc:spChg chg="mod">
-          <ac:chgData name="Sreejith Rajan" userId="ec11bca0e4bee75f" providerId="LiveId" clId="{7B4F392D-EAB3-4CE7-903E-F84869825F47}" dt="2025-09-10T14:22:53.992" v="441" actId="20577"/>
-          <ac:spMkLst>
-            <pc:docMk/>
-            <pc:sldMk cId="922807137" sldId="287"/>
-            <ac:spMk id="55" creationId="{018DD38A-A027-3C88-FB84-4BC84ACB7E6C}"/>
-          </ac:spMkLst>
-        </pc:spChg>
       </pc:sldChg>
       <pc:sldChg chg="modSp del mod">
         <pc:chgData name="Sreejith Rajan" userId="ec11bca0e4bee75f" providerId="LiveId" clId="{7B4F392D-EAB3-4CE7-903E-F84869825F47}" dt="2025-09-10T14:21:55.211" v="382" actId="47"/>
@@ -5137,76 +5089,6 @@
           </a:p>
         </p:txBody>
       </p:sp>
-      <p:sp>
-        <p:nvSpPr>
-          <p:cNvPr id="6" name="TextBox 5">
-            <a:extLst>
-              <a:ext uri="{FF2B5EF4-FFF2-40B4-BE49-F238E27FC236}">
-                <a16:creationId xmlns:a16="http://schemas.microsoft.com/office/drawing/2014/main" id="{20F1C902-EA40-2049-5E0F-6877922BA01D}"/>
-              </a:ext>
-            </a:extLst>
-          </p:cNvPr>
-          <p:cNvSpPr txBox="1"/>
-          <p:nvPr/>
-        </p:nvSpPr>
-        <p:spPr>
-          <a:xfrm>
-            <a:off x="4379174" y="1814287"/>
-            <a:ext cx="284052" cy="307777"/>
-          </a:xfrm>
-          <a:prstGeom prst="rect">
-            <a:avLst/>
-          </a:prstGeom>
-          <a:noFill/>
-        </p:spPr>
-        <p:txBody>
-          <a:bodyPr wrap="none" rtlCol="0">
-            <a:spAutoFit/>
-          </a:bodyPr>
-          <a:lstStyle/>
-          <a:p>
-            <a:r>
-              <a:rPr lang="en-IN" dirty="0"/>
-              <a:t>0</a:t>
-            </a:r>
-          </a:p>
-        </p:txBody>
-      </p:sp>
-      <p:sp>
-        <p:nvSpPr>
-          <p:cNvPr id="7" name="TextBox 6">
-            <a:extLst>
-              <a:ext uri="{FF2B5EF4-FFF2-40B4-BE49-F238E27FC236}">
-                <a16:creationId xmlns:a16="http://schemas.microsoft.com/office/drawing/2014/main" id="{61EA9A41-0228-6B61-02CB-7BDC9E84AF59}"/>
-              </a:ext>
-            </a:extLst>
-          </p:cNvPr>
-          <p:cNvSpPr txBox="1"/>
-          <p:nvPr/>
-        </p:nvSpPr>
-        <p:spPr>
-          <a:xfrm>
-            <a:off x="4379174" y="2263973"/>
-            <a:ext cx="284052" cy="307777"/>
-          </a:xfrm>
-          <a:prstGeom prst="rect">
-            <a:avLst/>
-          </a:prstGeom>
-          <a:noFill/>
-        </p:spPr>
-        <p:txBody>
-          <a:bodyPr wrap="none" rtlCol="0">
-            <a:spAutoFit/>
-          </a:bodyPr>
-          <a:lstStyle/>
-          <a:p>
-            <a:r>
-              <a:rPr lang="en-IN" dirty="0"/>
-              <a:t>1</a:t>
-            </a:r>
-          </a:p>
-        </p:txBody>
-      </p:sp>
     </p:spTree>
     <p:extLst>
       <p:ext uri="{BB962C8B-B14F-4D97-AF65-F5344CB8AC3E}">

</xml_diff>